<commit_message>
first commit of OnChange
</commit_message>
<xml_diff>
--- a/Protoripo Dashboard2.pptx
+++ b/Protoripo Dashboard2.pptx
@@ -199,7 +199,7 @@
           <a:p>
             <a:fld id="{6F56BF1A-49CD-0C40-BFD4-52FD0DF20AE8}" type="datetimeFigureOut">
               <a:rPr lang="en-BR" smtClean="0"/>
-              <a:t>17/11/22</a:t>
+              <a:t>20/11/22</a:t>
             </a:fld>
             <a:endParaRPr lang="en-BR"/>
           </a:p>
@@ -868,7 +868,7 @@
           <a:p>
             <a:fld id="{374CD52B-6380-F646-AC65-C3AD76EC02BD}" type="datetimeFigureOut">
               <a:rPr lang="en-BR" smtClean="0"/>
-              <a:t>17/11/22</a:t>
+              <a:t>20/11/22</a:t>
             </a:fld>
             <a:endParaRPr lang="en-BR"/>
           </a:p>
@@ -1068,7 +1068,7 @@
           <a:p>
             <a:fld id="{374CD52B-6380-F646-AC65-C3AD76EC02BD}" type="datetimeFigureOut">
               <a:rPr lang="en-BR" smtClean="0"/>
-              <a:t>17/11/22</a:t>
+              <a:t>20/11/22</a:t>
             </a:fld>
             <a:endParaRPr lang="en-BR"/>
           </a:p>
@@ -1278,7 +1278,7 @@
           <a:p>
             <a:fld id="{374CD52B-6380-F646-AC65-C3AD76EC02BD}" type="datetimeFigureOut">
               <a:rPr lang="en-BR" smtClean="0"/>
-              <a:t>17/11/22</a:t>
+              <a:t>20/11/22</a:t>
             </a:fld>
             <a:endParaRPr lang="en-BR"/>
           </a:p>
@@ -1478,7 +1478,7 @@
           <a:p>
             <a:fld id="{374CD52B-6380-F646-AC65-C3AD76EC02BD}" type="datetimeFigureOut">
               <a:rPr lang="en-BR" smtClean="0"/>
-              <a:t>17/11/22</a:t>
+              <a:t>20/11/22</a:t>
             </a:fld>
             <a:endParaRPr lang="en-BR"/>
           </a:p>
@@ -1754,7 +1754,7 @@
           <a:p>
             <a:fld id="{374CD52B-6380-F646-AC65-C3AD76EC02BD}" type="datetimeFigureOut">
               <a:rPr lang="en-BR" smtClean="0"/>
-              <a:t>17/11/22</a:t>
+              <a:t>20/11/22</a:t>
             </a:fld>
             <a:endParaRPr lang="en-BR"/>
           </a:p>
@@ -2022,7 +2022,7 @@
           <a:p>
             <a:fld id="{374CD52B-6380-F646-AC65-C3AD76EC02BD}" type="datetimeFigureOut">
               <a:rPr lang="en-BR" smtClean="0"/>
-              <a:t>17/11/22</a:t>
+              <a:t>20/11/22</a:t>
             </a:fld>
             <a:endParaRPr lang="en-BR"/>
           </a:p>
@@ -2437,7 +2437,7 @@
           <a:p>
             <a:fld id="{374CD52B-6380-F646-AC65-C3AD76EC02BD}" type="datetimeFigureOut">
               <a:rPr lang="en-BR" smtClean="0"/>
-              <a:t>17/11/22</a:t>
+              <a:t>20/11/22</a:t>
             </a:fld>
             <a:endParaRPr lang="en-BR"/>
           </a:p>
@@ -2579,7 +2579,7 @@
           <a:p>
             <a:fld id="{374CD52B-6380-F646-AC65-C3AD76EC02BD}" type="datetimeFigureOut">
               <a:rPr lang="en-BR" smtClean="0"/>
-              <a:t>17/11/22</a:t>
+              <a:t>20/11/22</a:t>
             </a:fld>
             <a:endParaRPr lang="en-BR"/>
           </a:p>
@@ -2692,7 +2692,7 @@
           <a:p>
             <a:fld id="{374CD52B-6380-F646-AC65-C3AD76EC02BD}" type="datetimeFigureOut">
               <a:rPr lang="en-BR" smtClean="0"/>
-              <a:t>17/11/22</a:t>
+              <a:t>20/11/22</a:t>
             </a:fld>
             <a:endParaRPr lang="en-BR"/>
           </a:p>
@@ -3005,7 +3005,7 @@
           <a:p>
             <a:fld id="{374CD52B-6380-F646-AC65-C3AD76EC02BD}" type="datetimeFigureOut">
               <a:rPr lang="en-BR" smtClean="0"/>
-              <a:t>17/11/22</a:t>
+              <a:t>20/11/22</a:t>
             </a:fld>
             <a:endParaRPr lang="en-BR"/>
           </a:p>
@@ -3294,7 +3294,7 @@
           <a:p>
             <a:fld id="{374CD52B-6380-F646-AC65-C3AD76EC02BD}" type="datetimeFigureOut">
               <a:rPr lang="en-BR" smtClean="0"/>
-              <a:t>17/11/22</a:t>
+              <a:t>20/11/22</a:t>
             </a:fld>
             <a:endParaRPr lang="en-BR"/>
           </a:p>
@@ -3537,7 +3537,7 @@
           <a:p>
             <a:fld id="{374CD52B-6380-F646-AC65-C3AD76EC02BD}" type="datetimeFigureOut">
               <a:rPr lang="en-BR" smtClean="0"/>
-              <a:t>17/11/22</a:t>
+              <a:t>20/11/22</a:t>
             </a:fld>
             <a:endParaRPr lang="en-BR"/>
           </a:p>
@@ -5177,7 +5177,7 @@
             <a:avLst/>
           </a:prstGeom>
           <a:solidFill>
-            <a:srgbClr val="FF0000"/>
+            <a:srgbClr val="FF7C9B"/>
           </a:solidFill>
           <a:ln>
             <a:solidFill>
@@ -7298,6 +7298,215 @@
           <a:xfrm>
             <a:off x="-681897" y="743034"/>
             <a:ext cx="553627" cy="3190107"/>
+          </a:xfrm>
+          <a:prstGeom prst="rect">
+            <a:avLst/>
+          </a:prstGeom>
+        </p:spPr>
+      </p:pic>
+      <p:sp>
+        <p:nvSpPr>
+          <p:cNvPr id="2" name="TextBox 1">
+            <a:extLst>
+              <a:ext uri="{FF2B5EF4-FFF2-40B4-BE49-F238E27FC236}">
+                <a16:creationId xmlns:a16="http://schemas.microsoft.com/office/drawing/2014/main" id="{237B2A6C-D1A3-42F2-8326-E14789A4E142}"/>
+              </a:ext>
+            </a:extLst>
+          </p:cNvPr>
+          <p:cNvSpPr txBox="1"/>
+          <p:nvPr/>
+        </p:nvSpPr>
+        <p:spPr>
+          <a:xfrm>
+            <a:off x="6965636" y="523591"/>
+            <a:ext cx="1862561" cy="369332"/>
+          </a:xfrm>
+          <a:prstGeom prst="rect">
+            <a:avLst/>
+          </a:prstGeom>
+          <a:noFill/>
+        </p:spPr>
+        <p:txBody>
+          <a:bodyPr wrap="none" rtlCol="0">
+            <a:spAutoFit/>
+          </a:bodyPr>
+          <a:lstStyle/>
+          <a:p>
+            <a:r>
+              <a:rPr lang="en-BR" dirty="0"/>
+              <a:t>Pedidos enviados </a:t>
+            </a:r>
+          </a:p>
+        </p:txBody>
+      </p:sp>
+      <p:pic>
+        <p:nvPicPr>
+          <p:cNvPr id="3" name="Picture 2">
+            <a:extLst>
+              <a:ext uri="{FF2B5EF4-FFF2-40B4-BE49-F238E27FC236}">
+                <a16:creationId xmlns:a16="http://schemas.microsoft.com/office/drawing/2014/main" id="{44654582-0456-2F32-44D2-5F1EDD7533A9}"/>
+              </a:ext>
+            </a:extLst>
+          </p:cNvPr>
+          <p:cNvPicPr>
+            <a:picLocks noChangeAspect="1"/>
+          </p:cNvPicPr>
+          <p:nvPr/>
+        </p:nvPicPr>
+        <p:blipFill>
+          <a:blip r:embed="rId13"/>
+          <a:stretch>
+            <a:fillRect/>
+          </a:stretch>
+        </p:blipFill>
+        <p:spPr>
+          <a:xfrm>
+            <a:off x="-3121747" y="6693586"/>
+            <a:ext cx="3594100" cy="1193800"/>
+          </a:xfrm>
+          <a:prstGeom prst="rect">
+            <a:avLst/>
+          </a:prstGeom>
+        </p:spPr>
+      </p:pic>
+      <p:pic>
+        <p:nvPicPr>
+          <p:cNvPr id="12" name="Picture 11">
+            <a:extLst>
+              <a:ext uri="{FF2B5EF4-FFF2-40B4-BE49-F238E27FC236}">
+                <a16:creationId xmlns:a16="http://schemas.microsoft.com/office/drawing/2014/main" id="{0FE5BABE-0889-40BF-8C24-B4F15B137C50}"/>
+              </a:ext>
+            </a:extLst>
+          </p:cNvPr>
+          <p:cNvPicPr>
+            <a:picLocks noChangeAspect="1"/>
+          </p:cNvPicPr>
+          <p:nvPr/>
+        </p:nvPicPr>
+        <p:blipFill>
+          <a:blip r:embed="rId14"/>
+          <a:stretch>
+            <a:fillRect/>
+          </a:stretch>
+        </p:blipFill>
+        <p:spPr>
+          <a:xfrm>
+            <a:off x="-3621560" y="4365769"/>
+            <a:ext cx="3594100" cy="1193800"/>
+          </a:xfrm>
+          <a:prstGeom prst="rect">
+            <a:avLst/>
+          </a:prstGeom>
+        </p:spPr>
+      </p:pic>
+      <p:sp>
+        <p:nvSpPr>
+          <p:cNvPr id="14" name="Rectangle 13">
+            <a:extLst>
+              <a:ext uri="{FF2B5EF4-FFF2-40B4-BE49-F238E27FC236}">
+                <a16:creationId xmlns:a16="http://schemas.microsoft.com/office/drawing/2014/main" id="{AC08C0D6-BCA7-588C-0D97-9EFF44A21256}"/>
+              </a:ext>
+            </a:extLst>
+          </p:cNvPr>
+          <p:cNvSpPr/>
+          <p:nvPr/>
+        </p:nvSpPr>
+        <p:spPr>
+          <a:xfrm>
+            <a:off x="5330766" y="4536802"/>
+            <a:ext cx="2430359" cy="154139"/>
+          </a:xfrm>
+          <a:prstGeom prst="rect">
+            <a:avLst/>
+          </a:prstGeom>
+          <a:solidFill>
+            <a:schemeClr val="bg1"/>
+          </a:solidFill>
+          <a:ln>
+            <a:solidFill>
+              <a:schemeClr val="bg1"/>
+            </a:solidFill>
+          </a:ln>
+        </p:spPr>
+        <p:style>
+          <a:lnRef idx="2">
+            <a:schemeClr val="accent1">
+              <a:shade val="50000"/>
+            </a:schemeClr>
+          </a:lnRef>
+          <a:fillRef idx="1">
+            <a:schemeClr val="accent1"/>
+          </a:fillRef>
+          <a:effectRef idx="0">
+            <a:schemeClr val="accent1"/>
+          </a:effectRef>
+          <a:fontRef idx="minor">
+            <a:schemeClr val="lt1"/>
+          </a:fontRef>
+        </p:style>
+        <p:txBody>
+          <a:bodyPr rtlCol="0" anchor="ctr"/>
+          <a:lstStyle/>
+          <a:p>
+            <a:pPr algn="ctr"/>
+            <a:endParaRPr lang="en-BR"/>
+          </a:p>
+        </p:txBody>
+      </p:sp>
+      <p:pic>
+        <p:nvPicPr>
+          <p:cNvPr id="15" name="Picture 14">
+            <a:extLst>
+              <a:ext uri="{FF2B5EF4-FFF2-40B4-BE49-F238E27FC236}">
+                <a16:creationId xmlns:a16="http://schemas.microsoft.com/office/drawing/2014/main" id="{897DD06F-6EFF-6F14-DB4B-433595C6A1FC}"/>
+              </a:ext>
+            </a:extLst>
+          </p:cNvPr>
+          <p:cNvPicPr>
+            <a:picLocks noChangeAspect="1"/>
+          </p:cNvPicPr>
+          <p:nvPr/>
+        </p:nvPicPr>
+        <p:blipFill>
+          <a:blip r:embed="rId15"/>
+          <a:stretch>
+            <a:fillRect/>
+          </a:stretch>
+        </p:blipFill>
+        <p:spPr>
+          <a:xfrm>
+            <a:off x="7463827" y="4813841"/>
+            <a:ext cx="224766" cy="337149"/>
+          </a:xfrm>
+          <a:prstGeom prst="rect">
+            <a:avLst/>
+          </a:prstGeom>
+        </p:spPr>
+      </p:pic>
+      <p:pic>
+        <p:nvPicPr>
+          <p:cNvPr id="16" name="Picture 15">
+            <a:extLst>
+              <a:ext uri="{FF2B5EF4-FFF2-40B4-BE49-F238E27FC236}">
+                <a16:creationId xmlns:a16="http://schemas.microsoft.com/office/drawing/2014/main" id="{CE920DA1-E6A0-8557-72DB-8185A01F1457}"/>
+              </a:ext>
+            </a:extLst>
+          </p:cNvPr>
+          <p:cNvPicPr>
+            <a:picLocks noChangeAspect="1"/>
+          </p:cNvPicPr>
+          <p:nvPr/>
+        </p:nvPicPr>
+        <p:blipFill>
+          <a:blip r:embed="rId16"/>
+          <a:stretch>
+            <a:fillRect/>
+          </a:stretch>
+        </p:blipFill>
+        <p:spPr>
+          <a:xfrm>
+            <a:off x="1462804" y="7341824"/>
+            <a:ext cx="6692900" cy="1625600"/>
           </a:xfrm>
           <a:prstGeom prst="rect">
             <a:avLst/>
@@ -11131,6 +11340,39 @@
           <a:prstGeom prst="rect">
             <a:avLst/>
           </a:prstGeom>
+        </p:spPr>
+      </p:pic>
+      <p:pic>
+        <p:nvPicPr>
+          <p:cNvPr id="23" name="Picture 22">
+            <a:extLst>
+              <a:ext uri="{FF2B5EF4-FFF2-40B4-BE49-F238E27FC236}">
+                <a16:creationId xmlns:a16="http://schemas.microsoft.com/office/drawing/2014/main" id="{3B9AF4CD-F18D-4635-62E5-F463015D4313}"/>
+              </a:ext>
+            </a:extLst>
+          </p:cNvPr>
+          <p:cNvPicPr>
+            <a:picLocks noChangeAspect="1"/>
+          </p:cNvPicPr>
+          <p:nvPr/>
+        </p:nvPicPr>
+        <p:blipFill>
+          <a:blip r:embed="rId13"/>
+          <a:stretch>
+            <a:fillRect/>
+          </a:stretch>
+        </p:blipFill>
+        <p:spPr>
+          <a:xfrm>
+            <a:off x="-11967" y="8313289"/>
+            <a:ext cx="4094084" cy="1537490"/>
+          </a:xfrm>
+          <a:prstGeom prst="rect">
+            <a:avLst/>
+          </a:prstGeom>
+          <a:solidFill>
+            <a:srgbClr val="B8B7BB"/>
+          </a:solidFill>
         </p:spPr>
       </p:pic>
     </p:spTree>

</xml_diff>